<commit_message>
version finale maquette appli
</commit_message>
<xml_diff>
--- a/maquette.pptx
+++ b/maquette.pptx
@@ -205,7 +205,7 @@
             <a:fld id="{FC8DB72E-93FD-495F-A9E5-D63B2B7609A3}" type="datetimeFigureOut">
               <a:rPr lang="fr-FR" smtClean="0"/>
               <a:pPr/>
-              <a:t>16/06/2018</a:t>
+              <a:t>17/06/2018</a:t>
             </a:fld>
             <a:endParaRPr lang="fr-FR"/>
           </a:p>
@@ -735,7 +735,7 @@
             <a:fld id="{0A8BCCA3-7A13-4726-82FF-BC5ADE3EF7BA}" type="datetimeFigureOut">
               <a:rPr lang="fr-FR" smtClean="0"/>
               <a:pPr/>
-              <a:t>16/06/2018</a:t>
+              <a:t>17/06/2018</a:t>
             </a:fld>
             <a:endParaRPr lang="fr-FR"/>
           </a:p>
@@ -902,7 +902,7 @@
             <a:fld id="{0A8BCCA3-7A13-4726-82FF-BC5ADE3EF7BA}" type="datetimeFigureOut">
               <a:rPr lang="fr-FR" smtClean="0"/>
               <a:pPr/>
-              <a:t>16/06/2018</a:t>
+              <a:t>17/06/2018</a:t>
             </a:fld>
             <a:endParaRPr lang="fr-FR"/>
           </a:p>
@@ -1079,7 +1079,7 @@
             <a:fld id="{0A8BCCA3-7A13-4726-82FF-BC5ADE3EF7BA}" type="datetimeFigureOut">
               <a:rPr lang="fr-FR" smtClean="0"/>
               <a:pPr/>
-              <a:t>16/06/2018</a:t>
+              <a:t>17/06/2018</a:t>
             </a:fld>
             <a:endParaRPr lang="fr-FR"/>
           </a:p>
@@ -1246,7 +1246,7 @@
             <a:fld id="{0A8BCCA3-7A13-4726-82FF-BC5ADE3EF7BA}" type="datetimeFigureOut">
               <a:rPr lang="fr-FR" smtClean="0"/>
               <a:pPr/>
-              <a:t>16/06/2018</a:t>
+              <a:t>17/06/2018</a:t>
             </a:fld>
             <a:endParaRPr lang="fr-FR"/>
           </a:p>
@@ -1489,7 +1489,7 @@
             <a:fld id="{0A8BCCA3-7A13-4726-82FF-BC5ADE3EF7BA}" type="datetimeFigureOut">
               <a:rPr lang="fr-FR" smtClean="0"/>
               <a:pPr/>
-              <a:t>16/06/2018</a:t>
+              <a:t>17/06/2018</a:t>
             </a:fld>
             <a:endParaRPr lang="fr-FR"/>
           </a:p>
@@ -1774,7 +1774,7 @@
             <a:fld id="{0A8BCCA3-7A13-4726-82FF-BC5ADE3EF7BA}" type="datetimeFigureOut">
               <a:rPr lang="fr-FR" smtClean="0"/>
               <a:pPr/>
-              <a:t>16/06/2018</a:t>
+              <a:t>17/06/2018</a:t>
             </a:fld>
             <a:endParaRPr lang="fr-FR"/>
           </a:p>
@@ -2193,7 +2193,7 @@
             <a:fld id="{0A8BCCA3-7A13-4726-82FF-BC5ADE3EF7BA}" type="datetimeFigureOut">
               <a:rPr lang="fr-FR" smtClean="0"/>
               <a:pPr/>
-              <a:t>16/06/2018</a:t>
+              <a:t>17/06/2018</a:t>
             </a:fld>
             <a:endParaRPr lang="fr-FR"/>
           </a:p>
@@ -2308,7 +2308,7 @@
             <a:fld id="{0A8BCCA3-7A13-4726-82FF-BC5ADE3EF7BA}" type="datetimeFigureOut">
               <a:rPr lang="fr-FR" smtClean="0"/>
               <a:pPr/>
-              <a:t>16/06/2018</a:t>
+              <a:t>17/06/2018</a:t>
             </a:fld>
             <a:endParaRPr lang="fr-FR"/>
           </a:p>
@@ -2400,7 +2400,7 @@
             <a:fld id="{0A8BCCA3-7A13-4726-82FF-BC5ADE3EF7BA}" type="datetimeFigureOut">
               <a:rPr lang="fr-FR" smtClean="0"/>
               <a:pPr/>
-              <a:t>16/06/2018</a:t>
+              <a:t>17/06/2018</a:t>
             </a:fld>
             <a:endParaRPr lang="fr-FR"/>
           </a:p>
@@ -2674,7 +2674,7 @@
             <a:fld id="{0A8BCCA3-7A13-4726-82FF-BC5ADE3EF7BA}" type="datetimeFigureOut">
               <a:rPr lang="fr-FR" smtClean="0"/>
               <a:pPr/>
-              <a:t>16/06/2018</a:t>
+              <a:t>17/06/2018</a:t>
             </a:fld>
             <a:endParaRPr lang="fr-FR"/>
           </a:p>
@@ -2924,7 +2924,7 @@
             <a:fld id="{0A8BCCA3-7A13-4726-82FF-BC5ADE3EF7BA}" type="datetimeFigureOut">
               <a:rPr lang="fr-FR" smtClean="0"/>
               <a:pPr/>
-              <a:t>16/06/2018</a:t>
+              <a:t>17/06/2018</a:t>
             </a:fld>
             <a:endParaRPr lang="fr-FR"/>
           </a:p>
@@ -3134,7 +3134,7 @@
             <a:fld id="{0A8BCCA3-7A13-4726-82FF-BC5ADE3EF7BA}" type="datetimeFigureOut">
               <a:rPr lang="fr-FR" smtClean="0"/>
               <a:pPr/>
-              <a:t>16/06/2018</a:t>
+              <a:t>17/06/2018</a:t>
             </a:fld>
             <a:endParaRPr lang="fr-FR"/>
           </a:p>
@@ -4276,7 +4276,7 @@
           </p:nvSpPr>
           <p:spPr>
             <a:xfrm>
-              <a:off x="2695600" y="3140969"/>
+              <a:off x="2695600" y="3068960"/>
               <a:ext cx="1872208" cy="307777"/>
             </a:xfrm>
             <a:prstGeom prst="rect">
@@ -4306,8 +4306,8 @@
           </p:nvSpPr>
           <p:spPr>
             <a:xfrm>
-              <a:off x="2695600" y="3529269"/>
-              <a:ext cx="1080120" cy="523220"/>
+              <a:off x="2695600" y="3429000"/>
+              <a:ext cx="1228328" cy="307777"/>
             </a:xfrm>
             <a:prstGeom prst="rect">
               <a:avLst/>
@@ -4336,7 +4336,7 @@
           </p:nvSpPr>
           <p:spPr>
             <a:xfrm>
-              <a:off x="2695600" y="3937314"/>
+              <a:off x="2695600" y="3769295"/>
               <a:ext cx="1656184" cy="307777"/>
             </a:xfrm>
             <a:prstGeom prst="rect">
@@ -4366,7 +4366,7 @@
           </p:nvSpPr>
           <p:spPr>
             <a:xfrm>
-              <a:off x="2695600" y="4345360"/>
+              <a:off x="2695600" y="4149080"/>
               <a:ext cx="1296144" cy="307777"/>
             </a:xfrm>
             <a:prstGeom prst="rect">
@@ -4396,7 +4396,7 @@
           </p:nvSpPr>
           <p:spPr>
             <a:xfrm>
-              <a:off x="3811724" y="4941169"/>
+              <a:off x="3811724" y="5013176"/>
               <a:ext cx="864096" cy="288032"/>
             </a:xfrm>
             <a:prstGeom prst="roundRect">
@@ -4454,7 +4454,7 @@
           </p:nvSpPr>
           <p:spPr>
             <a:xfrm>
-              <a:off x="4639816" y="3140969"/>
+              <a:off x="4639816" y="3068960"/>
               <a:ext cx="1152128" cy="307777"/>
             </a:xfrm>
             <a:prstGeom prst="rect">
@@ -4491,7 +4491,7 @@
           </p:nvSpPr>
           <p:spPr>
             <a:xfrm>
-              <a:off x="3847728" y="3529269"/>
+              <a:off x="3847728" y="3429000"/>
               <a:ext cx="1944216" cy="307777"/>
             </a:xfrm>
             <a:prstGeom prst="rect">
@@ -4528,7 +4528,7 @@
           </p:nvSpPr>
           <p:spPr>
             <a:xfrm>
-              <a:off x="4423792" y="3937314"/>
+              <a:off x="4423792" y="3789040"/>
               <a:ext cx="1368152" cy="307777"/>
             </a:xfrm>
             <a:prstGeom prst="rect">
@@ -4565,7 +4565,7 @@
           </p:nvSpPr>
           <p:spPr>
             <a:xfrm>
-              <a:off x="4063752" y="4345360"/>
+              <a:off x="4063752" y="4149080"/>
               <a:ext cx="1728192" cy="307777"/>
             </a:xfrm>
             <a:prstGeom prst="rect">
@@ -4802,6 +4802,117 @@
           </p:spPr>
         </p:pic>
       </p:grpSp>
+      <p:sp>
+        <p:nvSpPr>
+          <p:cNvPr id="25" name="ZoneTexte 24"/>
+          <p:cNvSpPr txBox="1"/>
+          <p:nvPr/>
+        </p:nvSpPr>
+        <p:spPr>
+          <a:xfrm>
+            <a:off x="2699792" y="4489375"/>
+            <a:ext cx="1656184" cy="307777"/>
+          </a:xfrm>
+          <a:prstGeom prst="rect">
+            <a:avLst/>
+          </a:prstGeom>
+          <a:noFill/>
+        </p:spPr>
+        <p:txBody>
+          <a:bodyPr wrap="square" rtlCol="0">
+            <a:spAutoFit/>
+          </a:bodyPr>
+          <a:lstStyle/>
+          <a:p>
+            <a:r>
+              <a:rPr lang="fr-FR" sz="1400" b="1" dirty="0" smtClean="0"/>
+              <a:t>Télécharger logo</a:t>
+            </a:r>
+            <a:endParaRPr lang="fr-FR" sz="1400" b="1" dirty="0"/>
+          </a:p>
+        </p:txBody>
+      </p:sp>
+      <p:sp>
+        <p:nvSpPr>
+          <p:cNvPr id="45" name="ZoneTexte 44"/>
+          <p:cNvSpPr txBox="1"/>
+          <p:nvPr/>
+        </p:nvSpPr>
+        <p:spPr>
+          <a:xfrm>
+            <a:off x="4067944" y="4479647"/>
+            <a:ext cx="432048" cy="389513"/>
+          </a:xfrm>
+          <a:prstGeom prst="ellipse">
+            <a:avLst/>
+          </a:prstGeom>
+          <a:solidFill>
+            <a:schemeClr val="bg1"/>
+          </a:solidFill>
+          <a:ln>
+            <a:solidFill>
+              <a:srgbClr val="FFCC00"/>
+            </a:solidFill>
+          </a:ln>
+        </p:spPr>
+        <p:txBody>
+          <a:bodyPr wrap="square" rtlCol="0">
+            <a:spAutoFit/>
+          </a:bodyPr>
+          <a:lstStyle/>
+          <a:p>
+            <a:endParaRPr lang="fr-FR" sz="1200" dirty="0"/>
+          </a:p>
+        </p:txBody>
+      </p:sp>
+      <p:sp>
+        <p:nvSpPr>
+          <p:cNvPr id="48" name="Flèche vers le bas 47"/>
+          <p:cNvSpPr/>
+          <p:nvPr/>
+        </p:nvSpPr>
+        <p:spPr>
+          <a:xfrm>
+            <a:off x="4139952" y="4581128"/>
+            <a:ext cx="288032" cy="216024"/>
+          </a:xfrm>
+          <a:prstGeom prst="downArrow">
+            <a:avLst/>
+          </a:prstGeom>
+          <a:solidFill>
+            <a:srgbClr val="FFC000"/>
+          </a:solidFill>
+          <a:ln>
+            <a:solidFill>
+              <a:srgbClr val="FFC000"/>
+            </a:solidFill>
+          </a:ln>
+        </p:spPr>
+        <p:style>
+          <a:lnRef idx="2">
+            <a:schemeClr val="accent1">
+              <a:shade val="50000"/>
+            </a:schemeClr>
+          </a:lnRef>
+          <a:fillRef idx="1">
+            <a:schemeClr val="accent1"/>
+          </a:fillRef>
+          <a:effectRef idx="0">
+            <a:schemeClr val="accent1"/>
+          </a:effectRef>
+          <a:fontRef idx="minor">
+            <a:schemeClr val="lt1"/>
+          </a:fontRef>
+        </p:style>
+        <p:txBody>
+          <a:bodyPr rtlCol="0" anchor="ctr"/>
+          <a:lstStyle/>
+          <a:p>
+            <a:pPr algn="ctr"/>
+            <a:endParaRPr lang="fr-FR"/>
+          </a:p>
+        </p:txBody>
+      </p:sp>
     </p:spTree>
   </p:cSld>
   <p:clrMapOvr>
@@ -8665,13 +8776,6 @@
                 </a:rPr>
                 <a:t>Synchronisation avec </a:t>
               </a:r>
-              <a:endParaRPr lang="fr-FR" sz="600" dirty="0" smtClean="0">
-                <a:solidFill>
-                  <a:schemeClr val="bg1">
-                    <a:lumMod val="95000"/>
-                  </a:schemeClr>
-                </a:solidFill>
-              </a:endParaRPr>
             </a:p>
             <a:p>
               <a:pPr algn="ctr"/>
@@ -8683,17 +8787,7 @@
                     </a:schemeClr>
                   </a:solidFill>
                 </a:rPr>
-                <a:t>compte </a:t>
-              </a:r>
-              <a:r>
-                <a:rPr lang="fr-FR" sz="600" dirty="0" smtClean="0">
-                  <a:solidFill>
-                    <a:schemeClr val="bg1">
-                      <a:lumMod val="95000"/>
-                    </a:schemeClr>
-                  </a:solidFill>
-                </a:rPr>
-                <a:t>bancaire</a:t>
+                <a:t>compte bancaire</a:t>
               </a:r>
               <a:endParaRPr lang="fr-FR" sz="600" dirty="0">
                 <a:solidFill>
@@ -9422,7 +9516,6 @@
                 <a:rPr lang="fr-FR" sz="400" dirty="0" smtClean="0"/>
                 <a:t> b</a:t>
               </a:r>
-              <a:endParaRPr lang="fr-FR" sz="400" dirty="0" smtClean="0"/>
             </a:p>
           </p:txBody>
         </p:sp>
@@ -16327,13 +16420,6 @@
                 </a:rPr>
                 <a:t>Synchronisation avec </a:t>
               </a:r>
-              <a:endParaRPr lang="fr-FR" dirty="0" smtClean="0">
-                <a:solidFill>
-                  <a:schemeClr val="bg1">
-                    <a:lumMod val="95000"/>
-                  </a:schemeClr>
-                </a:solidFill>
-              </a:endParaRPr>
             </a:p>
             <a:p>
               <a:pPr algn="ctr"/>
@@ -16345,17 +16431,7 @@
                     </a:schemeClr>
                   </a:solidFill>
                 </a:rPr>
-                <a:t>compte </a:t>
-              </a:r>
-              <a:r>
-                <a:rPr lang="fr-FR" dirty="0" smtClean="0">
-                  <a:solidFill>
-                    <a:schemeClr val="bg1">
-                      <a:lumMod val="95000"/>
-                    </a:schemeClr>
-                  </a:solidFill>
-                </a:rPr>
-                <a:t>bancaire</a:t>
+                <a:t>compte bancaire</a:t>
               </a:r>
               <a:endParaRPr lang="fr-FR" dirty="0">
                 <a:solidFill>

</xml_diff>